<commit_message>
Minor Updates to bringup slides
</commit_message>
<xml_diff>
--- a/bringup/PCB_Bringup_Seminar.pptx
+++ b/bringup/PCB_Bringup_Seminar.pptx
@@ -115,6 +115,11 @@
       </a:defRPr>
     </a:lvl9pPr>
   </p:defaultTextStyle>
+  <p:extLst>
+    <p:ext uri="{EFAFB233-063F-42B5-8137-9DF3F51BA10A}">
+      <p15:sldGuideLst xmlns:p15="http://schemas.microsoft.com/office/powerpoint/2012/main"/>
+    </p:ext>
+  </p:extLst>
 </p:presentation>
 </file>
 
@@ -3788,15 +3793,7 @@
           <a:p>
             <a:r>
               <a:rPr lang="en-US" dirty="0"/>
-              <a:t>PCB </a:t>
-            </a:r>
-            <a:r>
-              <a:rPr lang="en-US" dirty="0" err="1"/>
-              <a:t>Bringup</a:t>
-            </a:r>
-            <a:r>
-              <a:rPr lang="en-US" dirty="0"/>
-              <a:t> Seminar</a:t>
+              <a:t>PCB Bring-up Seminar</a:t>
             </a:r>
           </a:p>
         </p:txBody>
@@ -4719,14 +4716,14 @@
             <a:pPr lvl="1"/>
             <a:r>
               <a:rPr lang="en-US" dirty="0"/>
-              <a:t>P4_LV_IdealDiode_001_REVA PCBs (Qty up to 2)</a:t>
+              <a:t>P4_LV_IdealDiode_001_REVA PCBs</a:t>
             </a:r>
           </a:p>
           <a:p>
             <a:pPr lvl="1"/>
             <a:r>
               <a:rPr lang="en-US" dirty="0"/>
-              <a:t>Soldering iron (this can be done with the Hanko Station in MEHQ)</a:t>
+              <a:t>Soldering iron</a:t>
             </a:r>
           </a:p>
           <a:p>
@@ -4758,10 +4755,64 @@
             </a:r>
           </a:p>
           <a:p>
+            <a:pPr lvl="1"/>
+            <a:r>
+              <a:rPr lang="en-US" dirty="0"/>
+              <a:t>Oven</a:t>
+            </a:r>
+          </a:p>
+          <a:p>
             <a:endParaRPr lang="en-US" dirty="0"/>
           </a:p>
         </p:txBody>
       </p:sp>
+      <p:pic>
+        <p:nvPicPr>
+          <p:cNvPr id="1026" name="Picture 2" descr="Image result for solder oven">
+            <a:extLst>
+              <a:ext uri="{FF2B5EF4-FFF2-40B4-BE49-F238E27FC236}">
+                <a16:creationId xmlns:a16="http://schemas.microsoft.com/office/drawing/2014/main" id="{58F3CF0C-4900-4BAD-972A-99FCA0BB390A}"/>
+              </a:ext>
+            </a:extLst>
+          </p:cNvPr>
+          <p:cNvPicPr>
+            <a:picLocks noChangeAspect="1" noChangeArrowheads="1"/>
+          </p:cNvPicPr>
+          <p:nvPr/>
+        </p:nvPicPr>
+        <p:blipFill>
+          <a:blip r:embed="rId2">
+            <a:extLst>
+              <a:ext uri="{28A0092B-C50C-407E-A947-70E740481C1C}">
+                <a14:useLocalDpi xmlns:a14="http://schemas.microsoft.com/office/drawing/2010/main" val="0"/>
+              </a:ext>
+            </a:extLst>
+          </a:blip>
+          <a:srcRect/>
+          <a:stretch>
+            <a:fillRect/>
+          </a:stretch>
+        </p:blipFill>
+        <p:spPr bwMode="auto">
+          <a:xfrm>
+            <a:off x="7643813" y="1825625"/>
+            <a:ext cx="3562350" cy="3562350"/>
+          </a:xfrm>
+          <a:prstGeom prst="rect">
+            <a:avLst/>
+          </a:prstGeom>
+          <a:noFill/>
+          <a:extLst>
+            <a:ext uri="{909E8E84-426E-40DD-AFC4-6F175D3DCCD1}">
+              <a14:hiddenFill xmlns:a14="http://schemas.microsoft.com/office/drawing/2010/main">
+                <a:solidFill>
+                  <a:srgbClr val="FFFFFF"/>
+                </a:solidFill>
+              </a14:hiddenFill>
+            </a:ext>
+          </a:extLst>
+        </p:spPr>
+      </p:pic>
     </p:spTree>
     <p:extLst>
       <p:ext uri="{BB962C8B-B14F-4D97-AF65-F5344CB8AC3E}">

</xml_diff>

<commit_message>
Last edit on PCB Seminar Slides
</commit_message>
<xml_diff>
--- a/bringup/PCB_Bringup_Seminar.pptx
+++ b/bringup/PCB_Bringup_Seminar.pptx
@@ -5,7 +5,7 @@
     <p:sldMasterId id="2147483648" r:id="rId1"/>
   </p:sldMasterIdLst>
   <p:notesMasterIdLst>
-    <p:notesMasterId r:id="rId11"/>
+    <p:notesMasterId r:id="rId12"/>
   </p:notesMasterIdLst>
   <p:sldIdLst>
     <p:sldId id="256" r:id="rId2"/>
@@ -16,7 +16,8 @@
     <p:sldId id="261" r:id="rId7"/>
     <p:sldId id="262" r:id="rId8"/>
     <p:sldId id="263" r:id="rId9"/>
-    <p:sldId id="264" r:id="rId10"/>
+    <p:sldId id="265" r:id="rId10"/>
+    <p:sldId id="264" r:id="rId11"/>
   </p:sldIdLst>
   <p:sldSz cx="12192000" cy="6858000"/>
   <p:notesSz cx="6858000" cy="9144000"/>
@@ -3845,6 +3846,147 @@
 </p:sld>
 </file>
 
+<file path=ppt/slides/slide10.xml><?xml version="1.0" encoding="utf-8"?>
+<p:sld xmlns:a="http://schemas.openxmlformats.org/drawingml/2006/main" xmlns:r="http://schemas.openxmlformats.org/officeDocument/2006/relationships" xmlns:p="http://schemas.openxmlformats.org/presentationml/2006/main">
+  <p:cSld>
+    <p:spTree>
+      <p:nvGrpSpPr>
+        <p:cNvPr id="1" name=""/>
+        <p:cNvGrpSpPr/>
+        <p:nvPr/>
+      </p:nvGrpSpPr>
+      <p:grpSpPr>
+        <a:xfrm>
+          <a:off x="0" y="0"/>
+          <a:ext cx="0" cy="0"/>
+          <a:chOff x="0" y="0"/>
+          <a:chExt cx="0" cy="0"/>
+        </a:xfrm>
+      </p:grpSpPr>
+      <p:sp>
+        <p:nvSpPr>
+          <p:cNvPr id="2" name="Title 1">
+            <a:extLst>
+              <a:ext uri="{FF2B5EF4-FFF2-40B4-BE49-F238E27FC236}">
+                <a16:creationId xmlns:a16="http://schemas.microsoft.com/office/drawing/2014/main" id="{94C677B5-0435-4823-9C45-3D81491B0C42}"/>
+              </a:ext>
+            </a:extLst>
+          </p:cNvPr>
+          <p:cNvSpPr>
+            <a:spLocks noGrp="1"/>
+          </p:cNvSpPr>
+          <p:nvPr>
+            <p:ph type="title"/>
+          </p:nvPr>
+        </p:nvSpPr>
+        <p:spPr/>
+        <p:txBody>
+          <a:bodyPr/>
+          <a:lstStyle/>
+          <a:p>
+            <a:r>
+              <a:rPr lang="en-US" dirty="0"/>
+              <a:t>Bring-up PCBs</a:t>
+            </a:r>
+          </a:p>
+        </p:txBody>
+      </p:sp>
+      <p:sp>
+        <p:nvSpPr>
+          <p:cNvPr id="3" name="Content Placeholder 2">
+            <a:extLst>
+              <a:ext uri="{FF2B5EF4-FFF2-40B4-BE49-F238E27FC236}">
+                <a16:creationId xmlns:a16="http://schemas.microsoft.com/office/drawing/2014/main" id="{14A8434E-14BD-4AAC-A143-67B0D05C83EA}"/>
+              </a:ext>
+            </a:extLst>
+          </p:cNvPr>
+          <p:cNvSpPr>
+            <a:spLocks noGrp="1"/>
+          </p:cNvSpPr>
+          <p:nvPr>
+            <p:ph idx="1"/>
+          </p:nvPr>
+        </p:nvSpPr>
+        <p:spPr/>
+        <p:txBody>
+          <a:bodyPr/>
+          <a:lstStyle/>
+          <a:p>
+            <a:r>
+              <a:rPr lang="en-US" dirty="0"/>
+              <a:t>2-3 people per PCB</a:t>
+            </a:r>
+          </a:p>
+          <a:p>
+            <a:r>
+              <a:rPr lang="en-US" dirty="0"/>
+              <a:t>Boards:</a:t>
+            </a:r>
+          </a:p>
+          <a:p>
+            <a:pPr lvl="1"/>
+            <a:r>
+              <a:rPr lang="en-US" dirty="0"/>
+              <a:t>Test PCBs (x2)</a:t>
+            </a:r>
+          </a:p>
+          <a:p>
+            <a:pPr lvl="1"/>
+            <a:r>
+              <a:rPr lang="en-US" dirty="0"/>
+              <a:t>Processor (x5)</a:t>
+            </a:r>
+          </a:p>
+          <a:p>
+            <a:pPr lvl="1"/>
+            <a:r>
+              <a:rPr lang="en-US" dirty="0"/>
+              <a:t>Ideal Diode (x2)</a:t>
+            </a:r>
+          </a:p>
+          <a:p>
+            <a:pPr lvl="1"/>
+            <a:r>
+              <a:rPr lang="en-US" dirty="0"/>
+              <a:t>High Voltage Battery Breakout (x6) (Through Hole Only)</a:t>
+            </a:r>
+          </a:p>
+          <a:p>
+            <a:r>
+              <a:rPr lang="en-US" dirty="0"/>
+              <a:t>Parts are all in the </a:t>
+            </a:r>
+            <a:r>
+              <a:rPr lang="en-US" dirty="0" err="1"/>
+              <a:t>Digikey</a:t>
+            </a:r>
+            <a:r>
+              <a:rPr lang="en-US" dirty="0"/>
+              <a:t> Box</a:t>
+            </a:r>
+          </a:p>
+          <a:p>
+            <a:pPr lvl="1"/>
+            <a:r>
+              <a:rPr lang="en-US" dirty="0"/>
+              <a:t>Probably going to be a bottle neck. Be patient</a:t>
+            </a:r>
+          </a:p>
+        </p:txBody>
+      </p:sp>
+    </p:spTree>
+    <p:extLst>
+      <p:ext uri="{BB962C8B-B14F-4D97-AF65-F5344CB8AC3E}">
+        <p14:creationId xmlns:p14="http://schemas.microsoft.com/office/powerpoint/2010/main" val="3086756781"/>
+      </p:ext>
+    </p:extLst>
+  </p:cSld>
+  <p:clrMapOvr>
+    <a:masterClrMapping/>
+  </p:clrMapOvr>
+</p:sld>
+</file>
+
 <file path=ppt/slides/slide2.xml><?xml version="1.0" encoding="utf-8"?>
 <p:sld xmlns:a="http://schemas.openxmlformats.org/drawingml/2006/main" xmlns:r="http://schemas.openxmlformats.org/officeDocument/2006/relationships" xmlns:p="http://schemas.openxmlformats.org/presentationml/2006/main">
   <p:cSld>
@@ -4965,7 +5107,7 @@
           <p:cNvPr id="2" name="Title 1">
             <a:extLst>
               <a:ext uri="{FF2B5EF4-FFF2-40B4-BE49-F238E27FC236}">
-                <a16:creationId xmlns:a16="http://schemas.microsoft.com/office/drawing/2014/main" id="{94C677B5-0435-4823-9C45-3D81491B0C42}"/>
+                <a16:creationId xmlns:a16="http://schemas.microsoft.com/office/drawing/2014/main" id="{1867E9CC-C313-4143-86D7-AD7B92DBC9D7}"/>
               </a:ext>
             </a:extLst>
           </p:cNvPr>
@@ -4983,7 +5125,7 @@
           <a:p>
             <a:r>
               <a:rPr lang="en-US" dirty="0"/>
-              <a:t>Bring-up PCBs</a:t>
+              <a:t>What do I do if I find a problem with a board? Feature Request? </a:t>
             </a:r>
           </a:p>
         </p:txBody>
@@ -4993,7 +5135,7 @@
           <p:cNvPr id="3" name="Content Placeholder 2">
             <a:extLst>
               <a:ext uri="{FF2B5EF4-FFF2-40B4-BE49-F238E27FC236}">
-                <a16:creationId xmlns:a16="http://schemas.microsoft.com/office/drawing/2014/main" id="{14A8434E-14BD-4AAC-A143-67B0D05C83EA}"/>
+                <a16:creationId xmlns:a16="http://schemas.microsoft.com/office/drawing/2014/main" id="{D591A49D-6D7A-4367-956E-3318D0E42DA7}"/>
               </a:ext>
             </a:extLst>
           </p:cNvPr>
@@ -5004,69 +5146,289 @@
             <p:ph idx="1"/>
           </p:nvPr>
         </p:nvSpPr>
-        <p:spPr/>
-        <p:txBody>
-          <a:bodyPr/>
-          <a:lstStyle/>
-          <a:p>
-            <a:r>
-              <a:rPr lang="en-US" dirty="0"/>
-              <a:t>2-3 people per PCB</a:t>
-            </a:r>
-          </a:p>
-          <a:p>
-            <a:r>
-              <a:rPr lang="en-US" dirty="0"/>
-              <a:t>Boards:</a:t>
-            </a:r>
-          </a:p>
-          <a:p>
-            <a:pPr lvl="1"/>
-            <a:r>
-              <a:rPr lang="en-US" dirty="0"/>
-              <a:t>Test PCBs (x2)</a:t>
-            </a:r>
-          </a:p>
-          <a:p>
-            <a:pPr lvl="1"/>
-            <a:r>
-              <a:rPr lang="en-US" dirty="0"/>
-              <a:t>Processor (x5)</a:t>
-            </a:r>
-          </a:p>
-          <a:p>
-            <a:pPr lvl="1"/>
-            <a:r>
-              <a:rPr lang="en-US" dirty="0"/>
-              <a:t>Ideal Diode (x2)</a:t>
-            </a:r>
-          </a:p>
-          <a:p>
-            <a:pPr lvl="1"/>
-            <a:r>
-              <a:rPr lang="en-US" dirty="0"/>
-              <a:t>High Voltage Battery Breakout (x6) (Through Hole Only)</a:t>
-            </a:r>
-          </a:p>
-          <a:p>
-            <a:r>
-              <a:rPr lang="en-US" dirty="0"/>
-              <a:t>Parts are all in the </a:t>
+        <p:spPr>
+          <a:xfrm>
+            <a:off x="838200" y="1825625"/>
+            <a:ext cx="10515600" cy="2898775"/>
+          </a:xfrm>
+        </p:spPr>
+        <p:txBody>
+          <a:bodyPr>
+            <a:normAutofit lnSpcReduction="10000"/>
+          </a:bodyPr>
+          <a:lstStyle/>
+          <a:p>
+            <a:r>
+              <a:rPr lang="en-US" dirty="0"/>
+              <a:t>Possible Answers:</a:t>
+            </a:r>
+          </a:p>
+          <a:p>
+            <a:pPr marL="514350" indent="-514350">
+              <a:buAutoNum type="alphaUcPeriod"/>
+            </a:pPr>
+            <a:r>
+              <a:rPr lang="en-US" dirty="0"/>
+              <a:t>Scream</a:t>
+            </a:r>
+          </a:p>
+          <a:p>
+            <a:pPr marL="514350" indent="-514350">
+              <a:buAutoNum type="alphaUcPeriod"/>
+            </a:pPr>
+            <a:r>
+              <a:rPr lang="en-US" dirty="0"/>
+              <a:t>Shout</a:t>
+            </a:r>
+          </a:p>
+          <a:p>
+            <a:pPr marL="514350" indent="-514350">
+              <a:buAutoNum type="alphaUcPeriod"/>
+            </a:pPr>
+            <a:r>
+              <a:rPr lang="en-US" dirty="0"/>
+              <a:t>Ignore it and hope it will go away</a:t>
+            </a:r>
+          </a:p>
+          <a:p>
+            <a:pPr marL="514350" indent="-514350">
+              <a:buAutoNum type="alphaUcPeriod"/>
+            </a:pPr>
+            <a:r>
+              <a:rPr lang="en-US" dirty="0"/>
+              <a:t>Submit a Feature Request or Bug Report on </a:t>
             </a:r>
             <a:r>
               <a:rPr lang="en-US" dirty="0" err="1"/>
-              <a:t>Digikey</a:t>
-            </a:r>
-            <a:r>
-              <a:rPr lang="en-US" dirty="0"/>
-              <a:t> Box</a:t>
-            </a:r>
-          </a:p>
-          <a:p>
-            <a:pPr lvl="1"/>
-            <a:r>
-              <a:rPr lang="en-US" dirty="0"/>
-              <a:t>Probably going to be a bottle neck. Be patient</a:t>
+              <a:t>Github</a:t>
+            </a:r>
+            <a:endParaRPr lang="en-US" dirty="0"/>
+          </a:p>
+          <a:p>
+            <a:pPr marL="0" indent="0">
+              <a:buNone/>
+            </a:pPr>
+            <a:r>
+              <a:rPr lang="en-US" dirty="0"/>
+              <a:t> </a:t>
+            </a:r>
+          </a:p>
+        </p:txBody>
+      </p:sp>
+      <p:sp>
+        <p:nvSpPr>
+          <p:cNvPr id="4" name="Content Placeholder 2">
+            <a:extLst>
+              <a:ext uri="{FF2B5EF4-FFF2-40B4-BE49-F238E27FC236}">
+                <a16:creationId xmlns:a16="http://schemas.microsoft.com/office/drawing/2014/main" id="{ECEC645E-E787-44A4-8C53-F1AB508C4F7B}"/>
+              </a:ext>
+            </a:extLst>
+          </p:cNvPr>
+          <p:cNvSpPr txBox="1">
+            <a:spLocks/>
+          </p:cNvSpPr>
+          <p:nvPr/>
+        </p:nvSpPr>
+        <p:spPr>
+          <a:xfrm>
+            <a:off x="976312" y="5281613"/>
+            <a:ext cx="10515600" cy="1262062"/>
+          </a:xfrm>
+          <a:prstGeom prst="rect">
+            <a:avLst/>
+          </a:prstGeom>
+        </p:spPr>
+        <p:txBody>
+          <a:bodyPr vert="horz" lIns="91440" tIns="45720" rIns="91440" bIns="45720" rtlCol="0">
+            <a:normAutofit fontScale="92500" lnSpcReduction="20000"/>
+          </a:bodyPr>
+          <a:lstStyle>
+            <a:lvl1pPr marL="228600" indent="-228600" algn="l" defTabSz="914400" rtl="0" eaLnBrk="1" latinLnBrk="0" hangingPunct="1">
+              <a:lnSpc>
+                <a:spcPct val="90000"/>
+              </a:lnSpc>
+              <a:spcBef>
+                <a:spcPts val="1000"/>
+              </a:spcBef>
+              <a:buFont typeface="Arial" panose="020B0604020202020204" pitchFamily="34" charset="0"/>
+              <a:buChar char="•"/>
+              <a:defRPr sz="2800" kern="1200">
+                <a:solidFill>
+                  <a:schemeClr val="tx1"/>
+                </a:solidFill>
+                <a:latin typeface="+mn-lt"/>
+                <a:ea typeface="+mn-ea"/>
+                <a:cs typeface="+mn-cs"/>
+              </a:defRPr>
+            </a:lvl1pPr>
+            <a:lvl2pPr marL="685800" indent="-228600" algn="l" defTabSz="914400" rtl="0" eaLnBrk="1" latinLnBrk="0" hangingPunct="1">
+              <a:lnSpc>
+                <a:spcPct val="90000"/>
+              </a:lnSpc>
+              <a:spcBef>
+                <a:spcPts val="500"/>
+              </a:spcBef>
+              <a:buFont typeface="Arial" panose="020B0604020202020204" pitchFamily="34" charset="0"/>
+              <a:buChar char="•"/>
+              <a:defRPr sz="2400" kern="1200">
+                <a:solidFill>
+                  <a:schemeClr val="tx1"/>
+                </a:solidFill>
+                <a:latin typeface="+mn-lt"/>
+                <a:ea typeface="+mn-ea"/>
+                <a:cs typeface="+mn-cs"/>
+              </a:defRPr>
+            </a:lvl2pPr>
+            <a:lvl3pPr marL="1143000" indent="-228600" algn="l" defTabSz="914400" rtl="0" eaLnBrk="1" latinLnBrk="0" hangingPunct="1">
+              <a:lnSpc>
+                <a:spcPct val="90000"/>
+              </a:lnSpc>
+              <a:spcBef>
+                <a:spcPts val="500"/>
+              </a:spcBef>
+              <a:buFont typeface="Arial" panose="020B0604020202020204" pitchFamily="34" charset="0"/>
+              <a:buChar char="•"/>
+              <a:defRPr sz="2000" kern="1200">
+                <a:solidFill>
+                  <a:schemeClr val="tx1"/>
+                </a:solidFill>
+                <a:latin typeface="+mn-lt"/>
+                <a:ea typeface="+mn-ea"/>
+                <a:cs typeface="+mn-cs"/>
+              </a:defRPr>
+            </a:lvl3pPr>
+            <a:lvl4pPr marL="1600200" indent="-228600" algn="l" defTabSz="914400" rtl="0" eaLnBrk="1" latinLnBrk="0" hangingPunct="1">
+              <a:lnSpc>
+                <a:spcPct val="90000"/>
+              </a:lnSpc>
+              <a:spcBef>
+                <a:spcPts val="500"/>
+              </a:spcBef>
+              <a:buFont typeface="Arial" panose="020B0604020202020204" pitchFamily="34" charset="0"/>
+              <a:buChar char="•"/>
+              <a:defRPr sz="1800" kern="1200">
+                <a:solidFill>
+                  <a:schemeClr val="tx1"/>
+                </a:solidFill>
+                <a:latin typeface="+mn-lt"/>
+                <a:ea typeface="+mn-ea"/>
+                <a:cs typeface="+mn-cs"/>
+              </a:defRPr>
+            </a:lvl4pPr>
+            <a:lvl5pPr marL="2057400" indent="-228600" algn="l" defTabSz="914400" rtl="0" eaLnBrk="1" latinLnBrk="0" hangingPunct="1">
+              <a:lnSpc>
+                <a:spcPct val="90000"/>
+              </a:lnSpc>
+              <a:spcBef>
+                <a:spcPts val="500"/>
+              </a:spcBef>
+              <a:buFont typeface="Arial" panose="020B0604020202020204" pitchFamily="34" charset="0"/>
+              <a:buChar char="•"/>
+              <a:defRPr sz="1800" kern="1200">
+                <a:solidFill>
+                  <a:schemeClr val="tx1"/>
+                </a:solidFill>
+                <a:latin typeface="+mn-lt"/>
+                <a:ea typeface="+mn-ea"/>
+                <a:cs typeface="+mn-cs"/>
+              </a:defRPr>
+            </a:lvl5pPr>
+            <a:lvl6pPr marL="2514600" indent="-228600" algn="l" defTabSz="914400" rtl="0" eaLnBrk="1" latinLnBrk="0" hangingPunct="1">
+              <a:lnSpc>
+                <a:spcPct val="90000"/>
+              </a:lnSpc>
+              <a:spcBef>
+                <a:spcPts val="500"/>
+              </a:spcBef>
+              <a:buFont typeface="Arial" panose="020B0604020202020204" pitchFamily="34" charset="0"/>
+              <a:buChar char="•"/>
+              <a:defRPr sz="1800" kern="1200">
+                <a:solidFill>
+                  <a:schemeClr val="tx1"/>
+                </a:solidFill>
+                <a:latin typeface="+mn-lt"/>
+                <a:ea typeface="+mn-ea"/>
+                <a:cs typeface="+mn-cs"/>
+              </a:defRPr>
+            </a:lvl6pPr>
+            <a:lvl7pPr marL="2971800" indent="-228600" algn="l" defTabSz="914400" rtl="0" eaLnBrk="1" latinLnBrk="0" hangingPunct="1">
+              <a:lnSpc>
+                <a:spcPct val="90000"/>
+              </a:lnSpc>
+              <a:spcBef>
+                <a:spcPts val="500"/>
+              </a:spcBef>
+              <a:buFont typeface="Arial" panose="020B0604020202020204" pitchFamily="34" charset="0"/>
+              <a:buChar char="•"/>
+              <a:defRPr sz="1800" kern="1200">
+                <a:solidFill>
+                  <a:schemeClr val="tx1"/>
+                </a:solidFill>
+                <a:latin typeface="+mn-lt"/>
+                <a:ea typeface="+mn-ea"/>
+                <a:cs typeface="+mn-cs"/>
+              </a:defRPr>
+            </a:lvl7pPr>
+            <a:lvl8pPr marL="3429000" indent="-228600" algn="l" defTabSz="914400" rtl="0" eaLnBrk="1" latinLnBrk="0" hangingPunct="1">
+              <a:lnSpc>
+                <a:spcPct val="90000"/>
+              </a:lnSpc>
+              <a:spcBef>
+                <a:spcPts val="500"/>
+              </a:spcBef>
+              <a:buFont typeface="Arial" panose="020B0604020202020204" pitchFamily="34" charset="0"/>
+              <a:buChar char="•"/>
+              <a:defRPr sz="1800" kern="1200">
+                <a:solidFill>
+                  <a:schemeClr val="tx1"/>
+                </a:solidFill>
+                <a:latin typeface="+mn-lt"/>
+                <a:ea typeface="+mn-ea"/>
+                <a:cs typeface="+mn-cs"/>
+              </a:defRPr>
+            </a:lvl8pPr>
+            <a:lvl9pPr marL="3886200" indent="-228600" algn="l" defTabSz="914400" rtl="0" eaLnBrk="1" latinLnBrk="0" hangingPunct="1">
+              <a:lnSpc>
+                <a:spcPct val="90000"/>
+              </a:lnSpc>
+              <a:spcBef>
+                <a:spcPts val="500"/>
+              </a:spcBef>
+              <a:buFont typeface="Arial" panose="020B0604020202020204" pitchFamily="34" charset="0"/>
+              <a:buChar char="•"/>
+              <a:defRPr sz="1800" kern="1200">
+                <a:solidFill>
+                  <a:schemeClr val="tx1"/>
+                </a:solidFill>
+                <a:latin typeface="+mn-lt"/>
+                <a:ea typeface="+mn-ea"/>
+                <a:cs typeface="+mn-cs"/>
+              </a:defRPr>
+            </a:lvl9pPr>
+          </a:lstStyle>
+          <a:p>
+            <a:r>
+              <a:rPr lang="en-US" dirty="0"/>
+              <a:t>Answer: All Except C</a:t>
+            </a:r>
+          </a:p>
+          <a:p>
+            <a:r>
+              <a:rPr lang="en-US" dirty="0">
+                <a:hlinkClick r:id="rId2"/>
+              </a:rPr>
+              <a:t>https://github.com/badgerloop-software/podiv-altium/issues</a:t>
+            </a:r>
+            <a:endParaRPr lang="en-US" dirty="0"/>
+          </a:p>
+          <a:p>
+            <a:pPr marL="0" indent="0">
+              <a:buFont typeface="Arial" panose="020B0604020202020204" pitchFamily="34" charset="0"/>
+              <a:buNone/>
+            </a:pPr>
+            <a:r>
+              <a:rPr lang="en-US" dirty="0"/>
+              <a:t> </a:t>
             </a:r>
           </a:p>
         </p:txBody>
@@ -5074,13 +5436,168 @@
     </p:spTree>
     <p:extLst>
       <p:ext uri="{BB962C8B-B14F-4D97-AF65-F5344CB8AC3E}">
-        <p14:creationId xmlns:p14="http://schemas.microsoft.com/office/powerpoint/2010/main" val="3086756781"/>
+        <p14:creationId xmlns:p14="http://schemas.microsoft.com/office/powerpoint/2010/main" val="1160990814"/>
       </p:ext>
     </p:extLst>
   </p:cSld>
   <p:clrMapOvr>
     <a:masterClrMapping/>
   </p:clrMapOvr>
+  <p:timing>
+    <p:tnLst>
+      <p:par>
+        <p:cTn id="1" dur="indefinite" restart="never" nodeType="tmRoot">
+          <p:childTnLst>
+            <p:seq concurrent="1" nextAc="seek">
+              <p:cTn id="2" dur="indefinite" nodeType="mainSeq">
+                <p:childTnLst>
+                  <p:par>
+                    <p:cTn id="3" fill="hold">
+                      <p:stCondLst>
+                        <p:cond delay="indefinite"/>
+                      </p:stCondLst>
+                      <p:childTnLst>
+                        <p:par>
+                          <p:cTn id="4" fill="hold">
+                            <p:stCondLst>
+                              <p:cond delay="0"/>
+                            </p:stCondLst>
+                            <p:childTnLst>
+                              <p:par>
+                                <p:cTn id="5" presetID="35" presetClass="entr" presetSubtype="0" fill="hold" grpId="0" nodeType="clickEffect">
+                                  <p:stCondLst>
+                                    <p:cond delay="0"/>
+                                  </p:stCondLst>
+                                  <p:childTnLst>
+                                    <p:set>
+                                      <p:cBhvr>
+                                        <p:cTn id="6" dur="1" fill="hold">
+                                          <p:stCondLst>
+                                            <p:cond delay="0"/>
+                                          </p:stCondLst>
+                                        </p:cTn>
+                                        <p:tgtEl>
+                                          <p:spTgt spid="4"/>
+                                        </p:tgtEl>
+                                        <p:attrNameLst>
+                                          <p:attrName>style.visibility</p:attrName>
+                                        </p:attrNameLst>
+                                      </p:cBhvr>
+                                      <p:to>
+                                        <p:strVal val="visible"/>
+                                      </p:to>
+                                    </p:set>
+                                    <p:animEffect transition="in" filter="fade">
+                                      <p:cBhvr>
+                                        <p:cTn id="7" dur="2000"/>
+                                        <p:tgtEl>
+                                          <p:spTgt spid="4"/>
+                                        </p:tgtEl>
+                                      </p:cBhvr>
+                                    </p:animEffect>
+                                    <p:anim calcmode="lin" valueType="num">
+                                      <p:cBhvr>
+                                        <p:cTn id="8" dur="2000" fill="hold"/>
+                                        <p:tgtEl>
+                                          <p:spTgt spid="4"/>
+                                        </p:tgtEl>
+                                        <p:attrNameLst>
+                                          <p:attrName>style.rotation</p:attrName>
+                                        </p:attrNameLst>
+                                      </p:cBhvr>
+                                      <p:tavLst>
+                                        <p:tav tm="0">
+                                          <p:val>
+                                            <p:fltVal val="720"/>
+                                          </p:val>
+                                        </p:tav>
+                                        <p:tav tm="100000">
+                                          <p:val>
+                                            <p:fltVal val="0"/>
+                                          </p:val>
+                                        </p:tav>
+                                      </p:tavLst>
+                                    </p:anim>
+                                    <p:anim calcmode="lin" valueType="num">
+                                      <p:cBhvr>
+                                        <p:cTn id="9" dur="2000" fill="hold"/>
+                                        <p:tgtEl>
+                                          <p:spTgt spid="4"/>
+                                        </p:tgtEl>
+                                        <p:attrNameLst>
+                                          <p:attrName>ppt_h</p:attrName>
+                                        </p:attrNameLst>
+                                      </p:cBhvr>
+                                      <p:tavLst>
+                                        <p:tav tm="0">
+                                          <p:val>
+                                            <p:fltVal val="0"/>
+                                          </p:val>
+                                        </p:tav>
+                                        <p:tav tm="100000">
+                                          <p:val>
+                                            <p:strVal val="#ppt_h"/>
+                                          </p:val>
+                                        </p:tav>
+                                      </p:tavLst>
+                                    </p:anim>
+                                    <p:anim calcmode="lin" valueType="num">
+                                      <p:cBhvr>
+                                        <p:cTn id="10" dur="2000" fill="hold"/>
+                                        <p:tgtEl>
+                                          <p:spTgt spid="4"/>
+                                        </p:tgtEl>
+                                        <p:attrNameLst>
+                                          <p:attrName>ppt_w</p:attrName>
+                                        </p:attrNameLst>
+                                      </p:cBhvr>
+                                      <p:tavLst>
+                                        <p:tav tm="0">
+                                          <p:val>
+                                            <p:fltVal val="0"/>
+                                          </p:val>
+                                        </p:tav>
+                                        <p:tav tm="100000">
+                                          <p:val>
+                                            <p:strVal val="#ppt_w"/>
+                                          </p:val>
+                                        </p:tav>
+                                      </p:tavLst>
+                                    </p:anim>
+                                  </p:childTnLst>
+                                </p:cTn>
+                              </p:par>
+                            </p:childTnLst>
+                          </p:cTn>
+                        </p:par>
+                      </p:childTnLst>
+                    </p:cTn>
+                  </p:par>
+                </p:childTnLst>
+              </p:cTn>
+              <p:prevCondLst>
+                <p:cond evt="onPrev" delay="0">
+                  <p:tgtEl>
+                    <p:sldTgt/>
+                  </p:tgtEl>
+                </p:cond>
+              </p:prevCondLst>
+              <p:nextCondLst>
+                <p:cond evt="onNext" delay="0">
+                  <p:tgtEl>
+                    <p:sldTgt/>
+                  </p:tgtEl>
+                </p:cond>
+              </p:nextCondLst>
+            </p:seq>
+          </p:childTnLst>
+        </p:cTn>
+      </p:par>
+    </p:tnLst>
+    <p:bldLst>
+      <p:bldP spid="4" grpId="0"/>
+    </p:bldLst>
+  </p:timing>
 </p:sld>
 </file>
 

</xml_diff>